<commit_message>
full empty color changes
</commit_message>
<xml_diff>
--- a/fig/full_empty_circuit.pptx
+++ b/fig/full_empty_circuit.pptx
@@ -3346,9 +3346,179 @@
           <a:prstGeom prst="rect">
             <a:avLst/>
           </a:prstGeom>
+        </p:spPr>
+        <p:style>
+          <a:lnRef idx="2">
+            <a:schemeClr val="accent3">
+              <a:shade val="50000"/>
+            </a:schemeClr>
+          </a:lnRef>
+          <a:fillRef idx="1">
+            <a:schemeClr val="accent3"/>
+          </a:fillRef>
+          <a:effectRef idx="0">
+            <a:schemeClr val="accent3"/>
+          </a:effectRef>
+          <a:fontRef idx="minor">
+            <a:schemeClr val="lt1"/>
+          </a:fontRef>
+        </p:style>
+        <p:txBody>
+          <a:bodyPr rtlCol="0" anchor="ctr"/>
+          <a:lstStyle/>
+          <a:p>
+            <a:pPr algn="ctr"/>
+            <a:r>
+              <a:rPr lang="en-US" dirty="0"/>
+              <a:t>req</a:t>
+            </a:r>
+          </a:p>
+          <a:p>
+            <a:pPr algn="ctr"/>
+            <a:r>
+              <a:rPr lang="en-US" dirty="0"/>
+              <a:t>register</a:t>
+            </a:r>
+          </a:p>
+        </p:txBody>
+      </p:sp>
+      <p:sp>
+        <p:nvSpPr>
+          <p:cNvPr id="8" name="Rectangle 7">
+            <a:extLst>
+              <a:ext uri="{FF2B5EF4-FFF2-40B4-BE49-F238E27FC236}">
+                <a16:creationId xmlns:a16="http://schemas.microsoft.com/office/drawing/2014/main" id="{74E55C50-799A-45C6-8C1B-102557A8842A}"/>
+              </a:ext>
+            </a:extLst>
+          </p:cNvPr>
+          <p:cNvSpPr/>
+          <p:nvPr/>
+        </p:nvSpPr>
+        <p:spPr>
+          <a:xfrm>
+            <a:off x="5507734" y="4326840"/>
+            <a:ext cx="997330" cy="682238"/>
+          </a:xfrm>
+          <a:prstGeom prst="rect">
+            <a:avLst/>
+          </a:prstGeom>
+        </p:spPr>
+        <p:style>
+          <a:lnRef idx="2">
+            <a:schemeClr val="accent3">
+              <a:shade val="50000"/>
+            </a:schemeClr>
+          </a:lnRef>
+          <a:fillRef idx="1">
+            <a:schemeClr val="accent3"/>
+          </a:fillRef>
+          <a:effectRef idx="0">
+            <a:schemeClr val="accent3"/>
+          </a:effectRef>
+          <a:fontRef idx="minor">
+            <a:schemeClr val="lt1"/>
+          </a:fontRef>
+        </p:style>
+        <p:txBody>
+          <a:bodyPr rtlCol="0" anchor="ctr"/>
+          <a:lstStyle/>
+          <a:p>
+            <a:pPr algn="ctr"/>
+            <a:r>
+              <a:rPr lang="en-US" dirty="0"/>
+              <a:t>req int</a:t>
+            </a:r>
+          </a:p>
+          <a:p>
+            <a:pPr algn="ctr"/>
+            <a:r>
+              <a:rPr lang="en-US" dirty="0"/>
+              <a:t>register</a:t>
+            </a:r>
+          </a:p>
+        </p:txBody>
+      </p:sp>
+      <p:sp>
+        <p:nvSpPr>
+          <p:cNvPr id="14" name="Rectangle 13">
+            <a:extLst>
+              <a:ext uri="{FF2B5EF4-FFF2-40B4-BE49-F238E27FC236}">
+                <a16:creationId xmlns:a16="http://schemas.microsoft.com/office/drawing/2014/main" id="{705FE539-4410-46D2-92AD-0B372FC7DA00}"/>
+              </a:ext>
+            </a:extLst>
+          </p:cNvPr>
+          <p:cNvSpPr/>
+          <p:nvPr/>
+        </p:nvSpPr>
+        <p:spPr>
+          <a:xfrm>
+            <a:off x="3837073" y="4325568"/>
+            <a:ext cx="997330" cy="682238"/>
+          </a:xfrm>
+          <a:prstGeom prst="rect">
+            <a:avLst/>
+          </a:prstGeom>
           <a:solidFill>
+            <a:schemeClr val="accent3">
+              <a:lumMod val="50000"/>
+            </a:schemeClr>
+          </a:solidFill>
+        </p:spPr>
+        <p:style>
+          <a:lnRef idx="2">
+            <a:schemeClr val="accent3">
+              <a:shade val="50000"/>
+            </a:schemeClr>
+          </a:lnRef>
+          <a:fillRef idx="1">
             <a:schemeClr val="accent3"/>
-          </a:solidFill>
+          </a:fillRef>
+          <a:effectRef idx="0">
+            <a:schemeClr val="accent3"/>
+          </a:effectRef>
+          <a:fontRef idx="minor">
+            <a:schemeClr val="lt1"/>
+          </a:fontRef>
+        </p:style>
+        <p:txBody>
+          <a:bodyPr rtlCol="0" anchor="ctr"/>
+          <a:lstStyle/>
+          <a:p>
+            <a:pPr algn="ctr"/>
+            <a:r>
+              <a:rPr lang="en-US" dirty="0"/>
+              <a:t>req</a:t>
+            </a:r>
+          </a:p>
+          <a:p>
+            <a:pPr algn="ctr"/>
+            <a:r>
+              <a:rPr lang="en-US" dirty="0"/>
+              <a:t>latch</a:t>
+            </a:r>
+          </a:p>
+        </p:txBody>
+      </p:sp>
+      <p:sp>
+        <p:nvSpPr>
+          <p:cNvPr id="18" name="Rectangle 17">
+            <a:extLst>
+              <a:ext uri="{FF2B5EF4-FFF2-40B4-BE49-F238E27FC236}">
+                <a16:creationId xmlns:a16="http://schemas.microsoft.com/office/drawing/2014/main" id="{53EC7A1F-BF17-4FE1-B4AF-70135648EE48}"/>
+              </a:ext>
+            </a:extLst>
+          </p:cNvPr>
+          <p:cNvSpPr/>
+          <p:nvPr/>
+        </p:nvSpPr>
+        <p:spPr>
+          <a:xfrm>
+            <a:off x="3836213" y="1959674"/>
+            <a:ext cx="997330" cy="682238"/>
+          </a:xfrm>
+          <a:prstGeom prst="rect">
+            <a:avLst/>
+          </a:prstGeom>
         </p:spPr>
         <p:style>
           <a:lnRef idx="2">
@@ -3373,7 +3543,7 @@
             <a:pPr algn="ctr"/>
             <a:r>
               <a:rPr lang="en-US" dirty="0"/>
-              <a:t>req</a:t>
+              <a:t>ack</a:t>
             </a:r>
           </a:p>
           <a:p>
@@ -3387,10 +3557,10 @@
       </p:sp>
       <p:sp>
         <p:nvSpPr>
-          <p:cNvPr id="8" name="Rectangle 7">
-            <a:extLst>
-              <a:ext uri="{FF2B5EF4-FFF2-40B4-BE49-F238E27FC236}">
-                <a16:creationId xmlns:a16="http://schemas.microsoft.com/office/drawing/2014/main" id="{74E55C50-799A-45C6-8C1B-102557A8842A}"/>
+          <p:cNvPr id="20" name="Rectangle 19">
+            <a:extLst>
+              <a:ext uri="{FF2B5EF4-FFF2-40B4-BE49-F238E27FC236}">
+                <a16:creationId xmlns:a16="http://schemas.microsoft.com/office/drawing/2014/main" id="{03ADB3E3-CDAF-45E3-BF31-40D1B8737F20}"/>
               </a:ext>
             </a:extLst>
           </p:cNvPr>
@@ -3399,15 +3569,12 @@
         </p:nvSpPr>
         <p:spPr>
           <a:xfrm>
-            <a:off x="5507734" y="4326840"/>
+            <a:off x="5507734" y="1959674"/>
             <a:ext cx="997330" cy="682238"/>
           </a:xfrm>
           <a:prstGeom prst="rect">
             <a:avLst/>
           </a:prstGeom>
-          <a:solidFill>
-            <a:schemeClr val="accent3"/>
-          </a:solidFill>
         </p:spPr>
         <p:style>
           <a:lnRef idx="2">
@@ -3432,185 +3599,6 @@
             <a:pPr algn="ctr"/>
             <a:r>
               <a:rPr lang="en-US" dirty="0"/>
-              <a:t>req int</a:t>
-            </a:r>
-          </a:p>
-          <a:p>
-            <a:pPr algn="ctr"/>
-            <a:r>
-              <a:rPr lang="en-US" dirty="0"/>
-              <a:t>register</a:t>
-            </a:r>
-          </a:p>
-        </p:txBody>
-      </p:sp>
-      <p:sp>
-        <p:nvSpPr>
-          <p:cNvPr id="14" name="Rectangle 13">
-            <a:extLst>
-              <a:ext uri="{FF2B5EF4-FFF2-40B4-BE49-F238E27FC236}">
-                <a16:creationId xmlns:a16="http://schemas.microsoft.com/office/drawing/2014/main" id="{705FE539-4410-46D2-92AD-0B372FC7DA00}"/>
-              </a:ext>
-            </a:extLst>
-          </p:cNvPr>
-          <p:cNvSpPr/>
-          <p:nvPr/>
-        </p:nvSpPr>
-        <p:spPr>
-          <a:xfrm>
-            <a:off x="3837073" y="4325568"/>
-            <a:ext cx="997330" cy="682238"/>
-          </a:xfrm>
-          <a:prstGeom prst="rect">
-            <a:avLst/>
-          </a:prstGeom>
-          <a:solidFill>
-            <a:schemeClr val="accent3">
-              <a:lumMod val="50000"/>
-            </a:schemeClr>
-          </a:solidFill>
-        </p:spPr>
-        <p:style>
-          <a:lnRef idx="2">
-            <a:schemeClr val="accent3">
-              <a:shade val="50000"/>
-            </a:schemeClr>
-          </a:lnRef>
-          <a:fillRef idx="1">
-            <a:schemeClr val="accent3"/>
-          </a:fillRef>
-          <a:effectRef idx="0">
-            <a:schemeClr val="accent3"/>
-          </a:effectRef>
-          <a:fontRef idx="minor">
-            <a:schemeClr val="lt1"/>
-          </a:fontRef>
-        </p:style>
-        <p:txBody>
-          <a:bodyPr rtlCol="0" anchor="ctr"/>
-          <a:lstStyle/>
-          <a:p>
-            <a:pPr algn="ctr"/>
-            <a:r>
-              <a:rPr lang="en-US" dirty="0"/>
-              <a:t>req</a:t>
-            </a:r>
-          </a:p>
-          <a:p>
-            <a:pPr algn="ctr"/>
-            <a:r>
-              <a:rPr lang="en-US" dirty="0"/>
-              <a:t>latch</a:t>
-            </a:r>
-          </a:p>
-        </p:txBody>
-      </p:sp>
-      <p:sp>
-        <p:nvSpPr>
-          <p:cNvPr id="18" name="Rectangle 17">
-            <a:extLst>
-              <a:ext uri="{FF2B5EF4-FFF2-40B4-BE49-F238E27FC236}">
-                <a16:creationId xmlns:a16="http://schemas.microsoft.com/office/drawing/2014/main" id="{53EC7A1F-BF17-4FE1-B4AF-70135648EE48}"/>
-              </a:ext>
-            </a:extLst>
-          </p:cNvPr>
-          <p:cNvSpPr/>
-          <p:nvPr/>
-        </p:nvSpPr>
-        <p:spPr>
-          <a:xfrm>
-            <a:off x="3836213" y="1959674"/>
-            <a:ext cx="997330" cy="682238"/>
-          </a:xfrm>
-          <a:prstGeom prst="rect">
-            <a:avLst/>
-          </a:prstGeom>
-          <a:solidFill>
-            <a:schemeClr val="accent2"/>
-          </a:solidFill>
-        </p:spPr>
-        <p:style>
-          <a:lnRef idx="2">
-            <a:schemeClr val="accent3">
-              <a:shade val="50000"/>
-            </a:schemeClr>
-          </a:lnRef>
-          <a:fillRef idx="1">
-            <a:schemeClr val="accent3"/>
-          </a:fillRef>
-          <a:effectRef idx="0">
-            <a:schemeClr val="accent3"/>
-          </a:effectRef>
-          <a:fontRef idx="minor">
-            <a:schemeClr val="lt1"/>
-          </a:fontRef>
-        </p:style>
-        <p:txBody>
-          <a:bodyPr rtlCol="0" anchor="ctr"/>
-          <a:lstStyle/>
-          <a:p>
-            <a:pPr algn="ctr"/>
-            <a:r>
-              <a:rPr lang="en-US" dirty="0"/>
-              <a:t>ack</a:t>
-            </a:r>
-          </a:p>
-          <a:p>
-            <a:pPr algn="ctr"/>
-            <a:r>
-              <a:rPr lang="en-US" dirty="0"/>
-              <a:t>register</a:t>
-            </a:r>
-          </a:p>
-        </p:txBody>
-      </p:sp>
-      <p:sp>
-        <p:nvSpPr>
-          <p:cNvPr id="20" name="Rectangle 19">
-            <a:extLst>
-              <a:ext uri="{FF2B5EF4-FFF2-40B4-BE49-F238E27FC236}">
-                <a16:creationId xmlns:a16="http://schemas.microsoft.com/office/drawing/2014/main" id="{03ADB3E3-CDAF-45E3-BF31-40D1B8737F20}"/>
-              </a:ext>
-            </a:extLst>
-          </p:cNvPr>
-          <p:cNvSpPr/>
-          <p:nvPr/>
-        </p:nvSpPr>
-        <p:spPr>
-          <a:xfrm>
-            <a:off x="5507734" y="1959674"/>
-            <a:ext cx="997330" cy="682238"/>
-          </a:xfrm>
-          <a:prstGeom prst="rect">
-            <a:avLst/>
-          </a:prstGeom>
-          <a:solidFill>
-            <a:schemeClr val="accent2"/>
-          </a:solidFill>
-        </p:spPr>
-        <p:style>
-          <a:lnRef idx="2">
-            <a:schemeClr val="accent3">
-              <a:shade val="50000"/>
-            </a:schemeClr>
-          </a:lnRef>
-          <a:fillRef idx="1">
-            <a:schemeClr val="accent3"/>
-          </a:fillRef>
-          <a:effectRef idx="0">
-            <a:schemeClr val="accent3"/>
-          </a:effectRef>
-          <a:fontRef idx="minor">
-            <a:schemeClr val="lt1"/>
-          </a:fontRef>
-        </p:style>
-        <p:txBody>
-          <a:bodyPr rtlCol="0" anchor="ctr"/>
-          <a:lstStyle/>
-          <a:p>
-            <a:pPr algn="ctr"/>
-            <a:r>
-              <a:rPr lang="en-US" dirty="0"/>
               <a:t>ack int</a:t>
             </a:r>
           </a:p>
@@ -4441,6 +4429,16 @@
           <a:prstGeom prst="triangle">
             <a:avLst/>
           </a:prstGeom>
+          <a:solidFill>
+            <a:schemeClr val="accent2"/>
+          </a:solidFill>
+          <a:ln>
+            <a:solidFill>
+              <a:schemeClr val="accent2">
+                <a:lumMod val="75000"/>
+              </a:schemeClr>
+            </a:solidFill>
+          </a:ln>
         </p:spPr>
         <p:style>
           <a:lnRef idx="2">
@@ -4485,6 +4483,16 @@
           <a:prstGeom prst="triangle">
             <a:avLst/>
           </a:prstGeom>
+          <a:solidFill>
+            <a:schemeClr val="accent2"/>
+          </a:solidFill>
+          <a:ln>
+            <a:solidFill>
+              <a:schemeClr val="accent2">
+                <a:lumMod val="75000"/>
+              </a:schemeClr>
+            </a:solidFill>
+          </a:ln>
         </p:spPr>
         <p:style>
           <a:lnRef idx="2">
@@ -4529,6 +4537,16 @@
           <a:prstGeom prst="triangle">
             <a:avLst/>
           </a:prstGeom>
+          <a:solidFill>
+            <a:schemeClr val="accent3"/>
+          </a:solidFill>
+          <a:ln>
+            <a:solidFill>
+              <a:schemeClr val="accent3">
+                <a:lumMod val="75000"/>
+              </a:schemeClr>
+            </a:solidFill>
+          </a:ln>
         </p:spPr>
         <p:style>
           <a:lnRef idx="2">
@@ -4573,6 +4591,16 @@
           <a:prstGeom prst="triangle">
             <a:avLst/>
           </a:prstGeom>
+          <a:solidFill>
+            <a:schemeClr val="accent2"/>
+          </a:solidFill>
+          <a:ln>
+            <a:solidFill>
+              <a:schemeClr val="accent2">
+                <a:lumMod val="75000"/>
+              </a:schemeClr>
+            </a:solidFill>
+          </a:ln>
         </p:spPr>
         <p:style>
           <a:lnRef idx="2">
@@ -4710,6 +4738,16 @@
           <a:prstGeom prst="triangle">
             <a:avLst/>
           </a:prstGeom>
+          <a:solidFill>
+            <a:schemeClr val="accent3"/>
+          </a:solidFill>
+          <a:ln>
+            <a:solidFill>
+              <a:schemeClr val="accent3">
+                <a:lumMod val="75000"/>
+              </a:schemeClr>
+            </a:solidFill>
+          </a:ln>
         </p:spPr>
         <p:style>
           <a:lnRef idx="2">
@@ -4754,6 +4792,16 @@
           <a:prstGeom prst="triangle">
             <a:avLst/>
           </a:prstGeom>
+          <a:solidFill>
+            <a:schemeClr val="accent3"/>
+          </a:solidFill>
+          <a:ln>
+            <a:solidFill>
+              <a:schemeClr val="accent3">
+                <a:lumMod val="75000"/>
+              </a:schemeClr>
+            </a:solidFill>
+          </a:ln>
         </p:spPr>
         <p:style>
           <a:lnRef idx="2">

</xml_diff>

<commit_message>
Final final full empty circuit
</commit_message>
<xml_diff>
--- a/fig/full_empty_circuit.pptx
+++ b/fig/full_empty_circuit.pptx
@@ -4151,8 +4151,8 @@
         </p:nvCxnSpPr>
         <p:spPr>
           <a:xfrm>
-            <a:off x="4682675" y="1739433"/>
-            <a:ext cx="1017409" cy="225006"/>
+            <a:off x="4682675" y="1749593"/>
+            <a:ext cx="1017409" cy="214846"/>
           </a:xfrm>
           <a:prstGeom prst="bentConnector2">
             <a:avLst/>
@@ -4243,12 +4243,12 @@
         </p:nvCxnSpPr>
         <p:spPr>
           <a:xfrm rot="16200000" flipH="1">
-            <a:off x="2428502" y="2224975"/>
-            <a:ext cx="2651587" cy="1770994"/>
+            <a:off x="2433582" y="2230055"/>
+            <a:ext cx="2641427" cy="1770994"/>
           </a:xfrm>
           <a:prstGeom prst="bentConnector3">
             <a:avLst>
-              <a:gd name="adj1" fmla="val 108621"/>
+              <a:gd name="adj1" fmla="val 107885"/>
             </a:avLst>
           </a:prstGeom>
           <a:ln w="19050">
@@ -4296,7 +4296,7 @@
           </a:xfrm>
           <a:prstGeom prst="bentConnector3">
             <a:avLst>
-              <a:gd name="adj1" fmla="val 108674"/>
+              <a:gd name="adj1" fmla="val 108096"/>
             </a:avLst>
           </a:prstGeom>
           <a:ln w="19050">
@@ -4641,7 +4641,7 @@
         </p:nvSpPr>
         <p:spPr>
           <a:xfrm>
-            <a:off x="4592180" y="1694185"/>
+            <a:off x="4592180" y="1704345"/>
             <a:ext cx="90495" cy="90495"/>
           </a:xfrm>
           <a:prstGeom prst="flowChartConnector">
@@ -4697,7 +4697,7 @@
         </p:nvCxnSpPr>
         <p:spPr>
           <a:xfrm>
-            <a:off x="2914045" y="1739432"/>
+            <a:off x="2914045" y="1749592"/>
             <a:ext cx="1678135" cy="1"/>
           </a:xfrm>
           <a:prstGeom prst="line">
@@ -5127,7 +5127,7 @@
         </p:nvSpPr>
         <p:spPr>
           <a:xfrm>
-            <a:off x="2823550" y="1694184"/>
+            <a:off x="2823550" y="1704344"/>
             <a:ext cx="90495" cy="90495"/>
           </a:xfrm>
           <a:prstGeom prst="flowChartConnector">
@@ -5182,7 +5182,7 @@
         </p:nvCxnSpPr>
         <p:spPr>
           <a:xfrm flipH="1" flipV="1">
-            <a:off x="2155825" y="1739431"/>
+            <a:off x="2155825" y="1749591"/>
             <a:ext cx="667725" cy="1"/>
           </a:xfrm>
           <a:prstGeom prst="line">
@@ -5223,7 +5223,7 @@
         </p:nvSpPr>
         <p:spPr>
           <a:xfrm>
-            <a:off x="1563620" y="1370100"/>
+            <a:off x="1563620" y="1380260"/>
             <a:ext cx="1579617" cy="369332"/>
           </a:xfrm>
           <a:prstGeom prst="rect">
@@ -6468,8 +6468,8 @@
         </p:nvCxnSpPr>
         <p:spPr>
           <a:xfrm flipH="1">
-            <a:off x="4637427" y="1784680"/>
-            <a:ext cx="1" cy="174992"/>
+            <a:off x="4637427" y="1794840"/>
+            <a:ext cx="1" cy="164832"/>
           </a:xfrm>
           <a:prstGeom prst="straightConnector1">
             <a:avLst/>

</xml_diff>

<commit_message>
Fix full empty circuit diagram. Set full and empty were backwards.
</commit_message>
<xml_diff>
--- a/fig/full_empty_circuit.pptx
+++ b/fig/full_empty_circuit.pptx
@@ -259,7 +259,7 @@
           <a:p>
             <a:fld id="{35E1535C-2098-424B-897A-FF8113BB4E98}" type="datetimeFigureOut">
               <a:rPr lang="en-US" smtClean="0"/>
-              <a:t>11/17/2020</a:t>
+              <a:t>11/23/2020</a:t>
             </a:fld>
             <a:endParaRPr lang="en-US"/>
           </a:p>
@@ -457,7 +457,7 @@
           <a:p>
             <a:fld id="{35E1535C-2098-424B-897A-FF8113BB4E98}" type="datetimeFigureOut">
               <a:rPr lang="en-US" smtClean="0"/>
-              <a:t>11/17/2020</a:t>
+              <a:t>11/23/2020</a:t>
             </a:fld>
             <a:endParaRPr lang="en-US"/>
           </a:p>
@@ -665,7 +665,7 @@
           <a:p>
             <a:fld id="{35E1535C-2098-424B-897A-FF8113BB4E98}" type="datetimeFigureOut">
               <a:rPr lang="en-US" smtClean="0"/>
-              <a:t>11/17/2020</a:t>
+              <a:t>11/23/2020</a:t>
             </a:fld>
             <a:endParaRPr lang="en-US"/>
           </a:p>
@@ -863,7 +863,7 @@
           <a:p>
             <a:fld id="{35E1535C-2098-424B-897A-FF8113BB4E98}" type="datetimeFigureOut">
               <a:rPr lang="en-US" smtClean="0"/>
-              <a:t>11/17/2020</a:t>
+              <a:t>11/23/2020</a:t>
             </a:fld>
             <a:endParaRPr lang="en-US"/>
           </a:p>
@@ -1138,7 +1138,7 @@
           <a:p>
             <a:fld id="{35E1535C-2098-424B-897A-FF8113BB4E98}" type="datetimeFigureOut">
               <a:rPr lang="en-US" smtClean="0"/>
-              <a:t>11/17/2020</a:t>
+              <a:t>11/23/2020</a:t>
             </a:fld>
             <a:endParaRPr lang="en-US"/>
           </a:p>
@@ -1403,7 +1403,7 @@
           <a:p>
             <a:fld id="{35E1535C-2098-424B-897A-FF8113BB4E98}" type="datetimeFigureOut">
               <a:rPr lang="en-US" smtClean="0"/>
-              <a:t>11/17/2020</a:t>
+              <a:t>11/23/2020</a:t>
             </a:fld>
             <a:endParaRPr lang="en-US"/>
           </a:p>
@@ -1815,7 +1815,7 @@
           <a:p>
             <a:fld id="{35E1535C-2098-424B-897A-FF8113BB4E98}" type="datetimeFigureOut">
               <a:rPr lang="en-US" smtClean="0"/>
-              <a:t>11/17/2020</a:t>
+              <a:t>11/23/2020</a:t>
             </a:fld>
             <a:endParaRPr lang="en-US"/>
           </a:p>
@@ -1956,7 +1956,7 @@
           <a:p>
             <a:fld id="{35E1535C-2098-424B-897A-FF8113BB4E98}" type="datetimeFigureOut">
               <a:rPr lang="en-US" smtClean="0"/>
-              <a:t>11/17/2020</a:t>
+              <a:t>11/23/2020</a:t>
             </a:fld>
             <a:endParaRPr lang="en-US"/>
           </a:p>
@@ -2069,7 +2069,7 @@
           <a:p>
             <a:fld id="{35E1535C-2098-424B-897A-FF8113BB4E98}" type="datetimeFigureOut">
               <a:rPr lang="en-US" smtClean="0"/>
-              <a:t>11/17/2020</a:t>
+              <a:t>11/23/2020</a:t>
             </a:fld>
             <a:endParaRPr lang="en-US"/>
           </a:p>
@@ -2380,7 +2380,7 @@
           <a:p>
             <a:fld id="{35E1535C-2098-424B-897A-FF8113BB4E98}" type="datetimeFigureOut">
               <a:rPr lang="en-US" smtClean="0"/>
-              <a:t>11/17/2020</a:t>
+              <a:t>11/23/2020</a:t>
             </a:fld>
             <a:endParaRPr lang="en-US"/>
           </a:p>
@@ -2668,7 +2668,7 @@
           <a:p>
             <a:fld id="{35E1535C-2098-424B-897A-FF8113BB4E98}" type="datetimeFigureOut">
               <a:rPr lang="en-US" smtClean="0"/>
-              <a:t>11/17/2020</a:t>
+              <a:t>11/23/2020</a:t>
             </a:fld>
             <a:endParaRPr lang="en-US"/>
           </a:p>
@@ -2909,7 +2909,7 @@
           <a:p>
             <a:fld id="{35E1535C-2098-424B-897A-FF8113BB4E98}" type="datetimeFigureOut">
               <a:rPr lang="en-US" smtClean="0"/>
-              <a:t>11/17/2020</a:t>
+              <a:t>11/23/2020</a:t>
             </a:fld>
             <a:endParaRPr lang="en-US"/>
           </a:p>
@@ -5549,7 +5549,7 @@
         </p:nvSpPr>
         <p:spPr>
           <a:xfrm>
-            <a:off x="1582405" y="3719279"/>
+            <a:off x="1565779" y="3719279"/>
             <a:ext cx="1579617" cy="369332"/>
           </a:xfrm>
           <a:prstGeom prst="rect">
@@ -5565,7 +5565,7 @@
           <a:p>
             <a:r>
               <a:rPr lang="en-US" dirty="0"/>
-              <a:t>set empty</a:t>
+              <a:t>set full</a:t>
             </a:r>
           </a:p>
         </p:txBody>
@@ -5584,8 +5584,8 @@
         </p:nvSpPr>
         <p:spPr>
           <a:xfrm>
-            <a:off x="9733878" y="1929692"/>
-            <a:ext cx="909728" cy="369332"/>
+            <a:off x="9442932" y="1929692"/>
+            <a:ext cx="1147482" cy="369332"/>
           </a:xfrm>
           <a:prstGeom prst="rect">
             <a:avLst/>
@@ -5600,7 +5600,7 @@
           <a:p>
             <a:r>
               <a:rPr lang="en-US" dirty="0"/>
-              <a:t>set full</a:t>
+              <a:t>set empty</a:t>
             </a:r>
           </a:p>
         </p:txBody>

</xml_diff>

<commit_message>
Full/empty circuit diagram fix
</commit_message>
<xml_diff>
--- a/fig/full_empty_circuit.pptx
+++ b/fig/full_empty_circuit.pptx
@@ -259,7 +259,7 @@
           <a:p>
             <a:fld id="{35E1535C-2098-424B-897A-FF8113BB4E98}" type="datetimeFigureOut">
               <a:rPr lang="en-US" smtClean="0"/>
-              <a:t>11/23/2020</a:t>
+              <a:t>11/28/2020</a:t>
             </a:fld>
             <a:endParaRPr lang="en-US"/>
           </a:p>
@@ -457,7 +457,7 @@
           <a:p>
             <a:fld id="{35E1535C-2098-424B-897A-FF8113BB4E98}" type="datetimeFigureOut">
               <a:rPr lang="en-US" smtClean="0"/>
-              <a:t>11/23/2020</a:t>
+              <a:t>11/28/2020</a:t>
             </a:fld>
             <a:endParaRPr lang="en-US"/>
           </a:p>
@@ -665,7 +665,7 @@
           <a:p>
             <a:fld id="{35E1535C-2098-424B-897A-FF8113BB4E98}" type="datetimeFigureOut">
               <a:rPr lang="en-US" smtClean="0"/>
-              <a:t>11/23/2020</a:t>
+              <a:t>11/28/2020</a:t>
             </a:fld>
             <a:endParaRPr lang="en-US"/>
           </a:p>
@@ -863,7 +863,7 @@
           <a:p>
             <a:fld id="{35E1535C-2098-424B-897A-FF8113BB4E98}" type="datetimeFigureOut">
               <a:rPr lang="en-US" smtClean="0"/>
-              <a:t>11/23/2020</a:t>
+              <a:t>11/28/2020</a:t>
             </a:fld>
             <a:endParaRPr lang="en-US"/>
           </a:p>
@@ -1138,7 +1138,7 @@
           <a:p>
             <a:fld id="{35E1535C-2098-424B-897A-FF8113BB4E98}" type="datetimeFigureOut">
               <a:rPr lang="en-US" smtClean="0"/>
-              <a:t>11/23/2020</a:t>
+              <a:t>11/28/2020</a:t>
             </a:fld>
             <a:endParaRPr lang="en-US"/>
           </a:p>
@@ -1403,7 +1403,7 @@
           <a:p>
             <a:fld id="{35E1535C-2098-424B-897A-FF8113BB4E98}" type="datetimeFigureOut">
               <a:rPr lang="en-US" smtClean="0"/>
-              <a:t>11/23/2020</a:t>
+              <a:t>11/28/2020</a:t>
             </a:fld>
             <a:endParaRPr lang="en-US"/>
           </a:p>
@@ -1815,7 +1815,7 @@
           <a:p>
             <a:fld id="{35E1535C-2098-424B-897A-FF8113BB4E98}" type="datetimeFigureOut">
               <a:rPr lang="en-US" smtClean="0"/>
-              <a:t>11/23/2020</a:t>
+              <a:t>11/28/2020</a:t>
             </a:fld>
             <a:endParaRPr lang="en-US"/>
           </a:p>
@@ -1956,7 +1956,7 @@
           <a:p>
             <a:fld id="{35E1535C-2098-424B-897A-FF8113BB4E98}" type="datetimeFigureOut">
               <a:rPr lang="en-US" smtClean="0"/>
-              <a:t>11/23/2020</a:t>
+              <a:t>11/28/2020</a:t>
             </a:fld>
             <a:endParaRPr lang="en-US"/>
           </a:p>
@@ -2069,7 +2069,7 @@
           <a:p>
             <a:fld id="{35E1535C-2098-424B-897A-FF8113BB4E98}" type="datetimeFigureOut">
               <a:rPr lang="en-US" smtClean="0"/>
-              <a:t>11/23/2020</a:t>
+              <a:t>11/28/2020</a:t>
             </a:fld>
             <a:endParaRPr lang="en-US"/>
           </a:p>
@@ -2380,7 +2380,7 @@
           <a:p>
             <a:fld id="{35E1535C-2098-424B-897A-FF8113BB4E98}" type="datetimeFigureOut">
               <a:rPr lang="en-US" smtClean="0"/>
-              <a:t>11/23/2020</a:t>
+              <a:t>11/28/2020</a:t>
             </a:fld>
             <a:endParaRPr lang="en-US"/>
           </a:p>
@@ -2668,7 +2668,7 @@
           <a:p>
             <a:fld id="{35E1535C-2098-424B-897A-FF8113BB4E98}" type="datetimeFigureOut">
               <a:rPr lang="en-US" smtClean="0"/>
-              <a:t>11/23/2020</a:t>
+              <a:t>11/28/2020</a:t>
             </a:fld>
             <a:endParaRPr lang="en-US"/>
           </a:p>
@@ -2909,7 +2909,7 @@
           <a:p>
             <a:fld id="{35E1535C-2098-424B-897A-FF8113BB4E98}" type="datetimeFigureOut">
               <a:rPr lang="en-US" smtClean="0"/>
-              <a:t>11/23/2020</a:t>
+              <a:t>11/28/2020</a:t>
             </a:fld>
             <a:endParaRPr lang="en-US"/>
           </a:p>
@@ -5400,7 +5400,7 @@
           </a:prstGeom>
           <a:ln w="31750">
             <a:solidFill>
-              <a:schemeClr val="tx1"/>
+              <a:schemeClr val="accent2"/>
             </a:solidFill>
             <a:headEnd type="triangle"/>
           </a:ln>

</xml_diff>